<commit_message>
updated my slides, as well as added extra slides at back for easier access while explaining their flaws
</commit_message>
<xml_diff>
--- a/Critique/3249critiquepresentation.pptx
+++ b/Critique/3249critiquepresentation.pptx
@@ -5,7 +5,7 @@
     <p:sldMasterId id="2147483677" r:id="rId1"/>
   </p:sldMasterIdLst>
   <p:notesMasterIdLst>
-    <p:notesMasterId r:id="rId24"/>
+    <p:notesMasterId r:id="rId29"/>
   </p:notesMasterIdLst>
   <p:sldIdLst>
     <p:sldId id="256" r:id="rId2"/>
@@ -30,6 +30,11 @@
     <p:sldId id="275" r:id="rId21"/>
     <p:sldId id="276" r:id="rId22"/>
     <p:sldId id="273" r:id="rId23"/>
+    <p:sldId id="288" r:id="rId24"/>
+    <p:sldId id="289" r:id="rId25"/>
+    <p:sldId id="292" r:id="rId26"/>
+    <p:sldId id="290" r:id="rId27"/>
+    <p:sldId id="291" r:id="rId28"/>
   </p:sldIdLst>
   <p:sldSz cx="9144000" cy="6858000" type="screen4x3"/>
   <p:notesSz cx="6858000" cy="9144000"/>
@@ -130,7 +135,7 @@
   </p:defaultTextStyle>
   <p:extLst>
     <p:ext uri="{EFAFB233-063F-42B5-8137-9DF3F51BA10A}">
-      <p15:sldGuideLst xmlns:p15="http://schemas.microsoft.com/office/powerpoint/2012/main">
+      <p15:sldGuideLst xmlns:p15="http://schemas.microsoft.com/office/powerpoint/2012/main" xmlns="">
         <p15:guide id="1" orient="horz" pos="2160">
           <p15:clr>
             <a:srgbClr val="A4A3A4"/>
@@ -229,6 +234,7 @@
           <a:p>
             <a:fld id="{751A81AF-E037-614B-81A6-81CB521A279A}" type="datetimeFigureOut">
               <a:rPr lang="en-US" smtClean="0"/>
+              <a:pPr/>
               <a:t>4/8/2015</a:t>
             </a:fld>
             <a:endParaRPr lang="en-US"/>
@@ -388,6 +394,7 @@
           <a:p>
             <a:fld id="{60042047-2D8F-974C-9558-00B861429276}" type="slidenum">
               <a:rPr lang="en-US" smtClean="0"/>
+              <a:pPr/>
               <a:t>‹#›</a:t>
             </a:fld>
             <a:endParaRPr lang="en-US"/>
@@ -397,7 +404,7 @@
     </p:spTree>
     <p:extLst>
       <p:ext uri="{BB962C8B-B14F-4D97-AF65-F5344CB8AC3E}">
-        <p14:creationId xmlns:p14="http://schemas.microsoft.com/office/powerpoint/2010/main" val="2203036826"/>
+        <p14:creationId xmlns:p14="http://schemas.microsoft.com/office/powerpoint/2010/main" xmlns="" val="2203036826"/>
       </p:ext>
     </p:extLst>
   </p:cSld>
@@ -634,6 +641,7 @@
           <a:p>
             <a:fld id="{60042047-2D8F-974C-9558-00B861429276}" type="slidenum">
               <a:rPr lang="en-US" smtClean="0"/>
+              <a:pPr/>
               <a:t>3</a:t>
             </a:fld>
             <a:endParaRPr lang="en-US"/>
@@ -643,7 +651,7 @@
     </p:spTree>
     <p:extLst>
       <p:ext uri="{BB962C8B-B14F-4D97-AF65-F5344CB8AC3E}">
-        <p14:creationId xmlns:p14="http://schemas.microsoft.com/office/powerpoint/2010/main" val="1868042988"/>
+        <p14:creationId xmlns:p14="http://schemas.microsoft.com/office/powerpoint/2010/main" xmlns="" val="1868042988"/>
       </p:ext>
     </p:extLst>
   </p:cSld>
@@ -739,13 +747,47 @@
             </a:r>
           </a:p>
           <a:p>
-            <a:r>
-              <a:rPr lang="en-US" dirty="0" smtClean="0"/>
-              <a:t>-</a:t>
-            </a:r>
+            <a:pPr>
+              <a:buFontTx/>
+              <a:buChar char="-"/>
+            </a:pPr>
             <a:r>
               <a:rPr lang="en-US" baseline="0" dirty="0" smtClean="0"/>
-              <a:t> Removed redundant info on the dashboard</a:t>
+              <a:t>Removed </a:t>
+            </a:r>
+            <a:r>
+              <a:rPr lang="en-US" baseline="0" dirty="0" smtClean="0"/>
+              <a:t>redundant info on the </a:t>
+            </a:r>
+            <a:r>
+              <a:rPr lang="en-US" baseline="0" dirty="0" smtClean="0"/>
+              <a:t>dashboard</a:t>
+            </a:r>
+          </a:p>
+          <a:p>
+            <a:pPr>
+              <a:buFontTx/>
+              <a:buChar char="-"/>
+            </a:pPr>
+            <a:r>
+              <a:rPr lang="en-US" baseline="0" dirty="0" smtClean="0"/>
+              <a:t>Each section has its own </a:t>
+            </a:r>
+            <a:r>
+              <a:rPr lang="en-US" baseline="0" dirty="0" err="1" smtClean="0"/>
+              <a:t>colours</a:t>
+            </a:r>
+            <a:r>
+              <a:rPr lang="en-US" baseline="0" dirty="0" smtClean="0"/>
+              <a:t>, so that each section can be easily associated by </a:t>
+            </a:r>
+            <a:r>
+              <a:rPr lang="en-US" baseline="0" dirty="0" err="1" smtClean="0"/>
+              <a:t>colour</a:t>
+            </a:r>
+            <a:r>
+              <a:rPr lang="en-US" baseline="0" dirty="0" smtClean="0"/>
+              <a:t>, as well as to make the GUI less dull</a:t>
             </a:r>
             <a:endParaRPr lang="en-US" dirty="0"/>
           </a:p>
@@ -768,6 +810,7 @@
           <a:p>
             <a:fld id="{60042047-2D8F-974C-9558-00B861429276}" type="slidenum">
               <a:rPr lang="en-US" smtClean="0"/>
+              <a:pPr/>
               <a:t>18</a:t>
             </a:fld>
             <a:endParaRPr lang="en-US"/>
@@ -777,9 +820,197 @@
     </p:spTree>
     <p:extLst>
       <p:ext uri="{BB962C8B-B14F-4D97-AF65-F5344CB8AC3E}">
-        <p14:creationId xmlns:p14="http://schemas.microsoft.com/office/powerpoint/2010/main" val="938218089"/>
+        <p14:creationId xmlns:p14="http://schemas.microsoft.com/office/powerpoint/2010/main" xmlns="" val="938218089"/>
       </p:ext>
     </p:extLst>
+  </p:cSld>
+  <p:clrMapOvr>
+    <a:masterClrMapping/>
+  </p:clrMapOvr>
+</p:notes>
+</file>
+
+<file path=ppt/notesSlides/notesSlide3.xml><?xml version="1.0" encoding="utf-8"?>
+<p:notes xmlns:a="http://schemas.openxmlformats.org/drawingml/2006/main" xmlns:r="http://schemas.openxmlformats.org/officeDocument/2006/relationships" xmlns:p="http://schemas.openxmlformats.org/presentationml/2006/main">
+  <p:cSld>
+    <p:spTree>
+      <p:nvGrpSpPr>
+        <p:cNvPr id="1" name=""/>
+        <p:cNvGrpSpPr/>
+        <p:nvPr/>
+      </p:nvGrpSpPr>
+      <p:grpSpPr>
+        <a:xfrm>
+          <a:off x="0" y="0"/>
+          <a:ext cx="0" cy="0"/>
+          <a:chOff x="0" y="0"/>
+          <a:chExt cx="0" cy="0"/>
+        </a:xfrm>
+      </p:grpSpPr>
+      <p:sp>
+        <p:nvSpPr>
+          <p:cNvPr id="2" name="Slide Image Placeholder 1"/>
+          <p:cNvSpPr>
+            <a:spLocks noGrp="1" noRot="1" noChangeAspect="1"/>
+          </p:cNvSpPr>
+          <p:nvPr>
+            <p:ph type="sldImg"/>
+          </p:nvPr>
+        </p:nvSpPr>
+        <p:spPr/>
+      </p:sp>
+      <p:sp>
+        <p:nvSpPr>
+          <p:cNvPr id="3" name="Notes Placeholder 2"/>
+          <p:cNvSpPr>
+            <a:spLocks noGrp="1"/>
+          </p:cNvSpPr>
+          <p:nvPr>
+            <p:ph type="body" idx="1"/>
+          </p:nvPr>
+        </p:nvSpPr>
+        <p:spPr/>
+        <p:txBody>
+          <a:bodyPr>
+            <a:normAutofit/>
+          </a:bodyPr>
+          <a:lstStyle/>
+          <a:p>
+            <a:r>
+              <a:rPr lang="en-US" dirty="0" smtClean="0"/>
+              <a:t>Added</a:t>
+            </a:r>
+            <a:r>
+              <a:rPr lang="en-US" baseline="0" dirty="0" smtClean="0"/>
+              <a:t> a border of </a:t>
+            </a:r>
+            <a:r>
+              <a:rPr lang="en-US" baseline="0" dirty="0" err="1" smtClean="0"/>
+              <a:t>colour</a:t>
+            </a:r>
+            <a:r>
+              <a:rPr lang="en-US" baseline="0" dirty="0" smtClean="0"/>
+              <a:t> to be associated with each tab.</a:t>
+            </a:r>
+            <a:endParaRPr lang="en-SG" dirty="0"/>
+          </a:p>
+        </p:txBody>
+      </p:sp>
+      <p:sp>
+        <p:nvSpPr>
+          <p:cNvPr id="4" name="Slide Number Placeholder 3"/>
+          <p:cNvSpPr>
+            <a:spLocks noGrp="1"/>
+          </p:cNvSpPr>
+          <p:nvPr>
+            <p:ph type="sldNum" sz="quarter" idx="10"/>
+          </p:nvPr>
+        </p:nvSpPr>
+        <p:spPr/>
+        <p:txBody>
+          <a:bodyPr/>
+          <a:lstStyle/>
+          <a:p>
+            <a:fld id="{60042047-2D8F-974C-9558-00B861429276}" type="slidenum">
+              <a:rPr lang="en-US" smtClean="0"/>
+              <a:pPr/>
+              <a:t>19</a:t>
+            </a:fld>
+            <a:endParaRPr lang="en-US"/>
+          </a:p>
+        </p:txBody>
+      </p:sp>
+    </p:spTree>
+  </p:cSld>
+  <p:clrMapOvr>
+    <a:masterClrMapping/>
+  </p:clrMapOvr>
+</p:notes>
+</file>
+
+<file path=ppt/notesSlides/notesSlide4.xml><?xml version="1.0" encoding="utf-8"?>
+<p:notes xmlns:a="http://schemas.openxmlformats.org/drawingml/2006/main" xmlns:r="http://schemas.openxmlformats.org/officeDocument/2006/relationships" xmlns:p="http://schemas.openxmlformats.org/presentationml/2006/main">
+  <p:cSld>
+    <p:spTree>
+      <p:nvGrpSpPr>
+        <p:cNvPr id="1" name=""/>
+        <p:cNvGrpSpPr/>
+        <p:nvPr/>
+      </p:nvGrpSpPr>
+      <p:grpSpPr>
+        <a:xfrm>
+          <a:off x="0" y="0"/>
+          <a:ext cx="0" cy="0"/>
+          <a:chOff x="0" y="0"/>
+          <a:chExt cx="0" cy="0"/>
+        </a:xfrm>
+      </p:grpSpPr>
+      <p:sp>
+        <p:nvSpPr>
+          <p:cNvPr id="2" name="Slide Image Placeholder 1"/>
+          <p:cNvSpPr>
+            <a:spLocks noGrp="1" noRot="1" noChangeAspect="1"/>
+          </p:cNvSpPr>
+          <p:nvPr>
+            <p:ph type="sldImg"/>
+          </p:nvPr>
+        </p:nvSpPr>
+        <p:spPr/>
+      </p:sp>
+      <p:sp>
+        <p:nvSpPr>
+          <p:cNvPr id="3" name="Notes Placeholder 2"/>
+          <p:cNvSpPr>
+            <a:spLocks noGrp="1"/>
+          </p:cNvSpPr>
+          <p:nvPr>
+            <p:ph type="body" idx="1"/>
+          </p:nvPr>
+        </p:nvSpPr>
+        <p:spPr/>
+        <p:txBody>
+          <a:bodyPr>
+            <a:normAutofit/>
+          </a:bodyPr>
+          <a:lstStyle/>
+          <a:p>
+            <a:r>
+              <a:rPr lang="en-US" dirty="0" smtClean="0"/>
+              <a:t>Search by name</a:t>
+            </a:r>
+            <a:r>
+              <a:rPr lang="en-US" baseline="0" dirty="0" smtClean="0"/>
+              <a:t> too, instead of just identity no.</a:t>
+            </a:r>
+            <a:endParaRPr lang="en-SG" dirty="0"/>
+          </a:p>
+        </p:txBody>
+      </p:sp>
+      <p:sp>
+        <p:nvSpPr>
+          <p:cNvPr id="4" name="Slide Number Placeholder 3"/>
+          <p:cNvSpPr>
+            <a:spLocks noGrp="1"/>
+          </p:cNvSpPr>
+          <p:nvPr>
+            <p:ph type="sldNum" sz="quarter" idx="10"/>
+          </p:nvPr>
+        </p:nvSpPr>
+        <p:spPr/>
+        <p:txBody>
+          <a:bodyPr/>
+          <a:lstStyle/>
+          <a:p>
+            <a:fld id="{60042047-2D8F-974C-9558-00B861429276}" type="slidenum">
+              <a:rPr lang="en-US" smtClean="0"/>
+              <a:pPr/>
+              <a:t>20</a:t>
+            </a:fld>
+            <a:endParaRPr lang="en-US"/>
+          </a:p>
+        </p:txBody>
+      </p:sp>
+    </p:spTree>
   </p:cSld>
   <p:clrMapOvr>
     <a:masterClrMapping/>
@@ -968,6 +1199,7 @@
           <a:p>
             <a:fld id="{D140825E-4A15-4D39-8176-1F07E904CB30}" type="datetimeFigureOut">
               <a:rPr lang="en-US" smtClean="0"/>
+              <a:pPr/>
               <a:t>4/8/2015</a:t>
             </a:fld>
             <a:endParaRPr lang="en-US"/>
@@ -1010,6 +1242,7 @@
           <a:p>
             <a:fld id="{93E4AAA4-6363-4581-962D-1ACCC2D600C5}" type="slidenum">
               <a:rPr lang="en-US" smtClean="0"/>
+              <a:pPr/>
               <a:t>‹#›</a:t>
             </a:fld>
             <a:endParaRPr lang="en-US"/>
@@ -1019,7 +1252,7 @@
     </p:spTree>
     <p:extLst>
       <p:ext uri="{BB962C8B-B14F-4D97-AF65-F5344CB8AC3E}">
-        <p14:creationId xmlns:p14="http://schemas.microsoft.com/office/powerpoint/2010/main" val="2893444090"/>
+        <p14:creationId xmlns:p14="http://schemas.microsoft.com/office/powerpoint/2010/main" xmlns="" val="2893444090"/>
       </p:ext>
     </p:extLst>
   </p:cSld>
@@ -1138,6 +1371,7 @@
           <a:p>
             <a:fld id="{D140825E-4A15-4D39-8176-1F07E904CB30}" type="datetimeFigureOut">
               <a:rPr lang="en-US" smtClean="0"/>
+              <a:pPr/>
               <a:t>4/8/2015</a:t>
             </a:fld>
             <a:endParaRPr lang="en-US"/>
@@ -1180,6 +1414,7 @@
           <a:p>
             <a:fld id="{93E4AAA4-6363-4581-962D-1ACCC2D600C5}" type="slidenum">
               <a:rPr lang="en-US" smtClean="0"/>
+              <a:pPr/>
               <a:t>‹#›</a:t>
             </a:fld>
             <a:endParaRPr lang="en-US"/>
@@ -1189,7 +1424,7 @@
     </p:spTree>
     <p:extLst>
       <p:ext uri="{BB962C8B-B14F-4D97-AF65-F5344CB8AC3E}">
-        <p14:creationId xmlns:p14="http://schemas.microsoft.com/office/powerpoint/2010/main" val="3891497610"/>
+        <p14:creationId xmlns:p14="http://schemas.microsoft.com/office/powerpoint/2010/main" xmlns="" val="3891497610"/>
       </p:ext>
     </p:extLst>
   </p:cSld>
@@ -1318,6 +1553,7 @@
           <a:p>
             <a:fld id="{D140825E-4A15-4D39-8176-1F07E904CB30}" type="datetimeFigureOut">
               <a:rPr lang="en-US" smtClean="0"/>
+              <a:pPr/>
               <a:t>4/8/2015</a:t>
             </a:fld>
             <a:endParaRPr lang="en-US"/>
@@ -1360,6 +1596,7 @@
           <a:p>
             <a:fld id="{93E4AAA4-6363-4581-962D-1ACCC2D600C5}" type="slidenum">
               <a:rPr lang="en-US" smtClean="0"/>
+              <a:pPr/>
               <a:t>‹#›</a:t>
             </a:fld>
             <a:endParaRPr lang="en-US"/>
@@ -1369,7 +1606,7 @@
     </p:spTree>
     <p:extLst>
       <p:ext uri="{BB962C8B-B14F-4D97-AF65-F5344CB8AC3E}">
-        <p14:creationId xmlns:p14="http://schemas.microsoft.com/office/powerpoint/2010/main" val="970262559"/>
+        <p14:creationId xmlns:p14="http://schemas.microsoft.com/office/powerpoint/2010/main" xmlns="" val="970262559"/>
       </p:ext>
     </p:extLst>
   </p:cSld>
@@ -1488,6 +1725,7 @@
           <a:p>
             <a:fld id="{D140825E-4A15-4D39-8176-1F07E904CB30}" type="datetimeFigureOut">
               <a:rPr lang="en-US" smtClean="0"/>
+              <a:pPr/>
               <a:t>4/8/2015</a:t>
             </a:fld>
             <a:endParaRPr lang="en-US"/>
@@ -1530,6 +1768,7 @@
           <a:p>
             <a:fld id="{93E4AAA4-6363-4581-962D-1ACCC2D600C5}" type="slidenum">
               <a:rPr lang="en-US" smtClean="0"/>
+              <a:pPr/>
               <a:t>‹#›</a:t>
             </a:fld>
             <a:endParaRPr lang="en-US"/>
@@ -1539,7 +1778,7 @@
     </p:spTree>
     <p:extLst>
       <p:ext uri="{BB962C8B-B14F-4D97-AF65-F5344CB8AC3E}">
-        <p14:creationId xmlns:p14="http://schemas.microsoft.com/office/powerpoint/2010/main" val="2268819313"/>
+        <p14:creationId xmlns:p14="http://schemas.microsoft.com/office/powerpoint/2010/main" xmlns="" val="2268819313"/>
       </p:ext>
     </p:extLst>
   </p:cSld>
@@ -1734,6 +1973,7 @@
           <a:p>
             <a:fld id="{D140825E-4A15-4D39-8176-1F07E904CB30}" type="datetimeFigureOut">
               <a:rPr lang="en-US" smtClean="0"/>
+              <a:pPr/>
               <a:t>4/8/2015</a:t>
             </a:fld>
             <a:endParaRPr lang="en-US"/>
@@ -1776,6 +2016,7 @@
           <a:p>
             <a:fld id="{93E4AAA4-6363-4581-962D-1ACCC2D600C5}" type="slidenum">
               <a:rPr lang="en-US" smtClean="0"/>
+              <a:pPr/>
               <a:t>‹#›</a:t>
             </a:fld>
             <a:endParaRPr lang="en-US"/>
@@ -1785,7 +2026,7 @@
     </p:spTree>
     <p:extLst>
       <p:ext uri="{BB962C8B-B14F-4D97-AF65-F5344CB8AC3E}">
-        <p14:creationId xmlns:p14="http://schemas.microsoft.com/office/powerpoint/2010/main" val="449182162"/>
+        <p14:creationId xmlns:p14="http://schemas.microsoft.com/office/powerpoint/2010/main" xmlns="" val="449182162"/>
       </p:ext>
     </p:extLst>
   </p:cSld>
@@ -2022,6 +2263,7 @@
           <a:p>
             <a:fld id="{D140825E-4A15-4D39-8176-1F07E904CB30}" type="datetimeFigureOut">
               <a:rPr lang="en-US" smtClean="0"/>
+              <a:pPr/>
               <a:t>4/8/2015</a:t>
             </a:fld>
             <a:endParaRPr lang="en-US"/>
@@ -2064,6 +2306,7 @@
           <a:p>
             <a:fld id="{93E4AAA4-6363-4581-962D-1ACCC2D600C5}" type="slidenum">
               <a:rPr lang="en-US" smtClean="0"/>
+              <a:pPr/>
               <a:t>‹#›</a:t>
             </a:fld>
             <a:endParaRPr lang="en-US"/>
@@ -2073,7 +2316,7 @@
     </p:spTree>
     <p:extLst>
       <p:ext uri="{BB962C8B-B14F-4D97-AF65-F5344CB8AC3E}">
-        <p14:creationId xmlns:p14="http://schemas.microsoft.com/office/powerpoint/2010/main" val="260415902"/>
+        <p14:creationId xmlns:p14="http://schemas.microsoft.com/office/powerpoint/2010/main" xmlns="" val="260415902"/>
       </p:ext>
     </p:extLst>
   </p:cSld>
@@ -2444,6 +2687,7 @@
           <a:p>
             <a:fld id="{D140825E-4A15-4D39-8176-1F07E904CB30}" type="datetimeFigureOut">
               <a:rPr lang="en-US" smtClean="0"/>
+              <a:pPr/>
               <a:t>4/8/2015</a:t>
             </a:fld>
             <a:endParaRPr lang="en-US"/>
@@ -2486,6 +2730,7 @@
           <a:p>
             <a:fld id="{93E4AAA4-6363-4581-962D-1ACCC2D600C5}" type="slidenum">
               <a:rPr lang="en-US" smtClean="0"/>
+              <a:pPr/>
               <a:t>‹#›</a:t>
             </a:fld>
             <a:endParaRPr lang="en-US"/>
@@ -2495,7 +2740,7 @@
     </p:spTree>
     <p:extLst>
       <p:ext uri="{BB962C8B-B14F-4D97-AF65-F5344CB8AC3E}">
-        <p14:creationId xmlns:p14="http://schemas.microsoft.com/office/powerpoint/2010/main" val="651778251"/>
+        <p14:creationId xmlns:p14="http://schemas.microsoft.com/office/powerpoint/2010/main" xmlns="" val="651778251"/>
       </p:ext>
     </p:extLst>
   </p:cSld>
@@ -2562,6 +2807,7 @@
           <a:p>
             <a:fld id="{D140825E-4A15-4D39-8176-1F07E904CB30}" type="datetimeFigureOut">
               <a:rPr lang="en-US" smtClean="0"/>
+              <a:pPr/>
               <a:t>4/8/2015</a:t>
             </a:fld>
             <a:endParaRPr lang="en-US"/>
@@ -2604,6 +2850,7 @@
           <a:p>
             <a:fld id="{93E4AAA4-6363-4581-962D-1ACCC2D600C5}" type="slidenum">
               <a:rPr lang="en-US" smtClean="0"/>
+              <a:pPr/>
               <a:t>‹#›</a:t>
             </a:fld>
             <a:endParaRPr lang="en-US"/>
@@ -2613,7 +2860,7 @@
     </p:spTree>
     <p:extLst>
       <p:ext uri="{BB962C8B-B14F-4D97-AF65-F5344CB8AC3E}">
-        <p14:creationId xmlns:p14="http://schemas.microsoft.com/office/powerpoint/2010/main" val="749435865"/>
+        <p14:creationId xmlns:p14="http://schemas.microsoft.com/office/powerpoint/2010/main" xmlns="" val="749435865"/>
       </p:ext>
     </p:extLst>
   </p:cSld>
@@ -2657,6 +2904,7 @@
           <a:p>
             <a:fld id="{D140825E-4A15-4D39-8176-1F07E904CB30}" type="datetimeFigureOut">
               <a:rPr lang="en-US" smtClean="0"/>
+              <a:pPr/>
               <a:t>4/8/2015</a:t>
             </a:fld>
             <a:endParaRPr lang="en-US"/>
@@ -2699,6 +2947,7 @@
           <a:p>
             <a:fld id="{93E4AAA4-6363-4581-962D-1ACCC2D600C5}" type="slidenum">
               <a:rPr lang="en-US" smtClean="0"/>
+              <a:pPr/>
               <a:t>‹#›</a:t>
             </a:fld>
             <a:endParaRPr lang="en-US"/>
@@ -2708,7 +2957,7 @@
     </p:spTree>
     <p:extLst>
       <p:ext uri="{BB962C8B-B14F-4D97-AF65-F5344CB8AC3E}">
-        <p14:creationId xmlns:p14="http://schemas.microsoft.com/office/powerpoint/2010/main" val="2669200022"/>
+        <p14:creationId xmlns:p14="http://schemas.microsoft.com/office/powerpoint/2010/main" xmlns="" val="2669200022"/>
       </p:ext>
     </p:extLst>
   </p:cSld>
@@ -2934,6 +3183,7 @@
           <a:p>
             <a:fld id="{D140825E-4A15-4D39-8176-1F07E904CB30}" type="datetimeFigureOut">
               <a:rPr lang="en-US" smtClean="0"/>
+              <a:pPr/>
               <a:t>4/8/2015</a:t>
             </a:fld>
             <a:endParaRPr lang="en-US"/>
@@ -2976,6 +3226,7 @@
           <a:p>
             <a:fld id="{93E4AAA4-6363-4581-962D-1ACCC2D600C5}" type="slidenum">
               <a:rPr lang="en-US" smtClean="0"/>
+              <a:pPr/>
               <a:t>‹#›</a:t>
             </a:fld>
             <a:endParaRPr lang="en-US"/>
@@ -2985,7 +3236,7 @@
     </p:spTree>
     <p:extLst>
       <p:ext uri="{BB962C8B-B14F-4D97-AF65-F5344CB8AC3E}">
-        <p14:creationId xmlns:p14="http://schemas.microsoft.com/office/powerpoint/2010/main" val="1599073127"/>
+        <p14:creationId xmlns:p14="http://schemas.microsoft.com/office/powerpoint/2010/main" xmlns="" val="1599073127"/>
       </p:ext>
     </p:extLst>
   </p:cSld>
@@ -3187,6 +3438,7 @@
           <a:p>
             <a:fld id="{D140825E-4A15-4D39-8176-1F07E904CB30}" type="datetimeFigureOut">
               <a:rPr lang="en-US" smtClean="0"/>
+              <a:pPr/>
               <a:t>4/8/2015</a:t>
             </a:fld>
             <a:endParaRPr lang="en-US"/>
@@ -3229,6 +3481,7 @@
           <a:p>
             <a:fld id="{93E4AAA4-6363-4581-962D-1ACCC2D600C5}" type="slidenum">
               <a:rPr lang="en-US" smtClean="0"/>
+              <a:pPr/>
               <a:t>‹#›</a:t>
             </a:fld>
             <a:endParaRPr lang="en-US"/>
@@ -3238,7 +3491,7 @@
     </p:spTree>
     <p:extLst>
       <p:ext uri="{BB962C8B-B14F-4D97-AF65-F5344CB8AC3E}">
-        <p14:creationId xmlns:p14="http://schemas.microsoft.com/office/powerpoint/2010/main" val="960214"/>
+        <p14:creationId xmlns:p14="http://schemas.microsoft.com/office/powerpoint/2010/main" xmlns="" val="960214"/>
       </p:ext>
     </p:extLst>
   </p:cSld>
@@ -3400,6 +3653,7 @@
           <a:p>
             <a:fld id="{D140825E-4A15-4D39-8176-1F07E904CB30}" type="datetimeFigureOut">
               <a:rPr lang="en-US" smtClean="0"/>
+              <a:pPr/>
               <a:t>4/8/2015</a:t>
             </a:fld>
             <a:endParaRPr lang="en-US"/>
@@ -3478,6 +3732,7 @@
           <a:p>
             <a:fld id="{93E4AAA4-6363-4581-962D-1ACCC2D600C5}" type="slidenum">
               <a:rPr lang="en-US" smtClean="0"/>
+              <a:pPr/>
               <a:t>‹#›</a:t>
             </a:fld>
             <a:endParaRPr lang="en-US"/>
@@ -3487,7 +3742,7 @@
     </p:spTree>
     <p:extLst>
       <p:ext uri="{BB962C8B-B14F-4D97-AF65-F5344CB8AC3E}">
-        <p14:creationId xmlns:p14="http://schemas.microsoft.com/office/powerpoint/2010/main" val="2322369286"/>
+        <p14:creationId xmlns:p14="http://schemas.microsoft.com/office/powerpoint/2010/main" xmlns="" val="2322369286"/>
       </p:ext>
     </p:extLst>
   </p:cSld>
@@ -3816,7 +4071,7 @@
     </p:spTree>
     <p:extLst>
       <p:ext uri="{BB962C8B-B14F-4D97-AF65-F5344CB8AC3E}">
-        <p14:creationId xmlns:p14="http://schemas.microsoft.com/office/powerpoint/2010/main" val="523156795"/>
+        <p14:creationId xmlns:p14="http://schemas.microsoft.com/office/powerpoint/2010/main" xmlns="" val="523156795"/>
       </p:ext>
     </p:extLst>
   </p:cSld>
@@ -3894,7 +4149,7 @@
     </p:spTree>
     <p:extLst>
       <p:ext uri="{BB962C8B-B14F-4D97-AF65-F5344CB8AC3E}">
-        <p14:creationId xmlns:p14="http://schemas.microsoft.com/office/powerpoint/2010/main" val="1072180768"/>
+        <p14:creationId xmlns:p14="http://schemas.microsoft.com/office/powerpoint/2010/main" xmlns="" val="1072180768"/>
       </p:ext>
     </p:extLst>
   </p:cSld>
@@ -3980,7 +4235,7 @@
     </p:spTree>
     <p:extLst>
       <p:ext uri="{BB962C8B-B14F-4D97-AF65-F5344CB8AC3E}">
-        <p14:creationId xmlns:p14="http://schemas.microsoft.com/office/powerpoint/2010/main" val="1024293635"/>
+        <p14:creationId xmlns:p14="http://schemas.microsoft.com/office/powerpoint/2010/main" xmlns="" val="1024293635"/>
       </p:ext>
     </p:extLst>
   </p:cSld>
@@ -4019,7 +4274,7 @@
           <a:blip r:embed="rId2" cstate="email">
             <a:extLst>
               <a:ext uri="{28A0092B-C50C-407E-A947-70E740481C1C}">
-                <a14:useLocalDpi xmlns:a14="http://schemas.microsoft.com/office/drawing/2010/main" val="0"/>
+                <a14:useLocalDpi xmlns:a14="http://schemas.microsoft.com/office/drawing/2010/main" xmlns="" val="0"/>
               </a:ext>
             </a:extLst>
           </a:blip>
@@ -4067,7 +4322,7 @@
     </p:spTree>
     <p:extLst>
       <p:ext uri="{BB962C8B-B14F-4D97-AF65-F5344CB8AC3E}">
-        <p14:creationId xmlns:p14="http://schemas.microsoft.com/office/powerpoint/2010/main" val="2825497463"/>
+        <p14:creationId xmlns:p14="http://schemas.microsoft.com/office/powerpoint/2010/main" xmlns="" val="2825497463"/>
       </p:ext>
     </p:extLst>
   </p:cSld>
@@ -4145,7 +4400,7 @@
     </p:spTree>
     <p:extLst>
       <p:ext uri="{BB962C8B-B14F-4D97-AF65-F5344CB8AC3E}">
-        <p14:creationId xmlns:p14="http://schemas.microsoft.com/office/powerpoint/2010/main" val="1416485288"/>
+        <p14:creationId xmlns:p14="http://schemas.microsoft.com/office/powerpoint/2010/main" xmlns="" val="1416485288"/>
       </p:ext>
     </p:extLst>
   </p:cSld>
@@ -4223,7 +4478,7 @@
     </p:spTree>
     <p:extLst>
       <p:ext uri="{BB962C8B-B14F-4D97-AF65-F5344CB8AC3E}">
-        <p14:creationId xmlns:p14="http://schemas.microsoft.com/office/powerpoint/2010/main" val="1015128321"/>
+        <p14:creationId xmlns:p14="http://schemas.microsoft.com/office/powerpoint/2010/main" xmlns="" val="1015128321"/>
       </p:ext>
     </p:extLst>
   </p:cSld>
@@ -4262,7 +4517,7 @@
           <a:blip r:embed="rId2" cstate="email">
             <a:extLst>
               <a:ext uri="{28A0092B-C50C-407E-A947-70E740481C1C}">
-                <a14:useLocalDpi xmlns:a14="http://schemas.microsoft.com/office/drawing/2010/main" val="0"/>
+                <a14:useLocalDpi xmlns:a14="http://schemas.microsoft.com/office/drawing/2010/main" xmlns="" val="0"/>
               </a:ext>
             </a:extLst>
           </a:blip>
@@ -4311,7 +4566,7 @@
     </p:spTree>
     <p:extLst>
       <p:ext uri="{BB962C8B-B14F-4D97-AF65-F5344CB8AC3E}">
-        <p14:creationId xmlns:p14="http://schemas.microsoft.com/office/powerpoint/2010/main" val="831393095"/>
+        <p14:creationId xmlns:p14="http://schemas.microsoft.com/office/powerpoint/2010/main" xmlns="" val="831393095"/>
       </p:ext>
     </p:extLst>
   </p:cSld>
@@ -4378,11 +4633,7 @@
           <a:p>
             <a:r>
               <a:rPr lang="en-US" dirty="0" smtClean="0"/>
-              <a:t>Tabl</a:t>
-            </a:r>
-            <a:r>
-              <a:rPr lang="en-US" dirty="0" smtClean="0"/>
-              <a:t>e/tabs optimal for displaying data</a:t>
+              <a:t>Table/tabs optimal for displaying data</a:t>
             </a:r>
           </a:p>
           <a:p>
@@ -4393,7 +4644,7 @@
     </p:spTree>
     <p:extLst>
       <p:ext uri="{BB962C8B-B14F-4D97-AF65-F5344CB8AC3E}">
-        <p14:creationId xmlns:p14="http://schemas.microsoft.com/office/powerpoint/2010/main" val="50069371"/>
+        <p14:creationId xmlns:p14="http://schemas.microsoft.com/office/powerpoint/2010/main" xmlns="" val="50069371"/>
       </p:ext>
     </p:extLst>
   </p:cSld>
@@ -4477,7 +4728,7 @@
     </p:spTree>
     <p:extLst>
       <p:ext uri="{BB962C8B-B14F-4D97-AF65-F5344CB8AC3E}">
-        <p14:creationId xmlns:p14="http://schemas.microsoft.com/office/powerpoint/2010/main" val="1185134679"/>
+        <p14:creationId xmlns:p14="http://schemas.microsoft.com/office/powerpoint/2010/main" xmlns="" val="1185134679"/>
       </p:ext>
     </p:extLst>
   </p:cSld>
@@ -4536,10 +4787,10 @@
           <p:nvPr/>
         </p:nvPicPr>
         <p:blipFill>
-          <a:blip r:embed="rId3">
+          <a:blip r:embed="rId3" cstate="print">
             <a:extLst>
               <a:ext uri="{28A0092B-C50C-407E-A947-70E740481C1C}">
-                <a14:useLocalDpi xmlns:a14="http://schemas.microsoft.com/office/drawing/2010/main" val="0"/>
+                <a14:useLocalDpi xmlns:a14="http://schemas.microsoft.com/office/drawing/2010/main" xmlns="" val="0"/>
               </a:ext>
             </a:extLst>
           </a:blip>
@@ -4560,7 +4811,7 @@
     </p:spTree>
     <p:extLst>
       <p:ext uri="{BB962C8B-B14F-4D97-AF65-F5344CB8AC3E}">
-        <p14:creationId xmlns:p14="http://schemas.microsoft.com/office/powerpoint/2010/main" val="2069603194"/>
+        <p14:creationId xmlns:p14="http://schemas.microsoft.com/office/powerpoint/2010/main" xmlns="" val="2069603194"/>
       </p:ext>
     </p:extLst>
   </p:cSld>
@@ -4596,10 +4847,10 @@
           <p:nvPr/>
         </p:nvPicPr>
         <p:blipFill>
-          <a:blip r:embed="rId2">
+          <a:blip r:embed="rId3" cstate="print">
             <a:extLst>
               <a:ext uri="{28A0092B-C50C-407E-A947-70E740481C1C}">
-                <a14:useLocalDpi xmlns:a14="http://schemas.microsoft.com/office/drawing/2010/main" val="0"/>
+                <a14:useLocalDpi xmlns:a14="http://schemas.microsoft.com/office/drawing/2010/main" xmlns="" val="0"/>
               </a:ext>
             </a:extLst>
           </a:blip>
@@ -4648,7 +4899,7 @@
     </p:spTree>
     <p:extLst>
       <p:ext uri="{BB962C8B-B14F-4D97-AF65-F5344CB8AC3E}">
-        <p14:creationId xmlns:p14="http://schemas.microsoft.com/office/powerpoint/2010/main" val="361316415"/>
+        <p14:creationId xmlns:p14="http://schemas.microsoft.com/office/powerpoint/2010/main" xmlns="" val="361316415"/>
       </p:ext>
     </p:extLst>
   </p:cSld>
@@ -4755,7 +5006,7 @@
     </p:spTree>
     <p:extLst>
       <p:ext uri="{BB962C8B-B14F-4D97-AF65-F5344CB8AC3E}">
-        <p14:creationId xmlns:p14="http://schemas.microsoft.com/office/powerpoint/2010/main" val="3769806519"/>
+        <p14:creationId xmlns:p14="http://schemas.microsoft.com/office/powerpoint/2010/main" xmlns="" val="3769806519"/>
       </p:ext>
     </p:extLst>
   </p:cSld>
@@ -4791,10 +5042,10 @@
           <p:nvPr/>
         </p:nvPicPr>
         <p:blipFill>
-          <a:blip r:embed="rId2">
+          <a:blip r:embed="rId3" cstate="print">
             <a:extLst>
               <a:ext uri="{28A0092B-C50C-407E-A947-70E740481C1C}">
-                <a14:useLocalDpi xmlns:a14="http://schemas.microsoft.com/office/drawing/2010/main" val="0"/>
+                <a14:useLocalDpi xmlns:a14="http://schemas.microsoft.com/office/drawing/2010/main" xmlns="" val="0"/>
               </a:ext>
             </a:extLst>
           </a:blip>
@@ -4843,7 +5094,7 @@
     </p:spTree>
     <p:extLst>
       <p:ext uri="{BB962C8B-B14F-4D97-AF65-F5344CB8AC3E}">
-        <p14:creationId xmlns:p14="http://schemas.microsoft.com/office/powerpoint/2010/main" val="3655502748"/>
+        <p14:creationId xmlns:p14="http://schemas.microsoft.com/office/powerpoint/2010/main" xmlns="" val="3655502748"/>
       </p:ext>
     </p:extLst>
   </p:cSld>
@@ -4873,7 +5124,7 @@
     </p:spTree>
     <p:extLst>
       <p:ext uri="{BB962C8B-B14F-4D97-AF65-F5344CB8AC3E}">
-        <p14:creationId xmlns:p14="http://schemas.microsoft.com/office/powerpoint/2010/main" val="3744789490"/>
+        <p14:creationId xmlns:p14="http://schemas.microsoft.com/office/powerpoint/2010/main" xmlns="" val="3744789490"/>
       </p:ext>
     </p:extLst>
   </p:cSld>
@@ -5128,9 +5379,471 @@
     </p:spTree>
     <p:extLst>
       <p:ext uri="{BB962C8B-B14F-4D97-AF65-F5344CB8AC3E}">
-        <p14:creationId xmlns:p14="http://schemas.microsoft.com/office/powerpoint/2010/main" val="59852980"/>
+        <p14:creationId xmlns:p14="http://schemas.microsoft.com/office/powerpoint/2010/main" xmlns="" val="59852980"/>
       </p:ext>
     </p:extLst>
+  </p:cSld>
+  <p:clrMapOvr>
+    <a:masterClrMapping/>
+  </p:clrMapOvr>
+</p:sld>
+</file>
+
+<file path=ppt/slides/slide23.xml><?xml version="1.0" encoding="utf-8"?>
+<p:sld xmlns:a="http://schemas.openxmlformats.org/drawingml/2006/main" xmlns:r="http://schemas.openxmlformats.org/officeDocument/2006/relationships" xmlns:p="http://schemas.openxmlformats.org/presentationml/2006/main">
+  <p:cSld>
+    <p:spTree>
+      <p:nvGrpSpPr>
+        <p:cNvPr id="1" name=""/>
+        <p:cNvGrpSpPr/>
+        <p:nvPr/>
+      </p:nvGrpSpPr>
+      <p:grpSpPr>
+        <a:xfrm>
+          <a:off x="0" y="0"/>
+          <a:ext cx="0" cy="0"/>
+          <a:chOff x="0" y="0"/>
+          <a:chExt cx="0" cy="0"/>
+        </a:xfrm>
+      </p:grpSpPr>
+      <p:sp>
+        <p:nvSpPr>
+          <p:cNvPr id="2" name="Title 1"/>
+          <p:cNvSpPr>
+            <a:spLocks noGrp="1"/>
+          </p:cNvSpPr>
+          <p:nvPr>
+            <p:ph type="title"/>
+          </p:nvPr>
+        </p:nvSpPr>
+        <p:spPr/>
+        <p:txBody>
+          <a:bodyPr/>
+          <a:lstStyle/>
+          <a:p>
+            <a:endParaRPr lang="en-SG"/>
+          </a:p>
+        </p:txBody>
+      </p:sp>
+      <p:sp>
+        <p:nvSpPr>
+          <p:cNvPr id="3" name="Content Placeholder 2"/>
+          <p:cNvSpPr>
+            <a:spLocks noGrp="1"/>
+          </p:cNvSpPr>
+          <p:nvPr>
+            <p:ph idx="1"/>
+          </p:nvPr>
+        </p:nvSpPr>
+        <p:spPr/>
+        <p:txBody>
+          <a:bodyPr/>
+          <a:lstStyle/>
+          <a:p>
+            <a:endParaRPr lang="en-SG"/>
+          </a:p>
+        </p:txBody>
+      </p:sp>
+      <p:pic>
+        <p:nvPicPr>
+          <p:cNvPr id="4" name="Picture 3" descr="Screen Shot 2015-04-07 at 16.18.54.png"/>
+          <p:cNvPicPr>
+            <a:picLocks noChangeAspect="1"/>
+          </p:cNvPicPr>
+          <p:nvPr/>
+        </p:nvPicPr>
+        <p:blipFill rotWithShape="1">
+          <a:blip r:embed="rId2" cstate="email">
+            <a:extLst>
+              <a:ext uri="{28A0092B-C50C-407E-A947-70E740481C1C}">
+                <a14:useLocalDpi xmlns:a14="http://schemas.microsoft.com/office/drawing/2010/main" xmlns="" val="0"/>
+              </a:ext>
+            </a:extLst>
+          </a:blip>
+          <a:srcRect l="4003" r="5734"/>
+          <a:stretch/>
+        </p:blipFill>
+        <p:spPr>
+          <a:xfrm>
+            <a:off x="729257" y="1230426"/>
+            <a:ext cx="7720063" cy="5345611"/>
+          </a:xfrm>
+          <a:prstGeom prst="rect">
+            <a:avLst/>
+          </a:prstGeom>
+        </p:spPr>
+      </p:pic>
+    </p:spTree>
+  </p:cSld>
+  <p:clrMapOvr>
+    <a:masterClrMapping/>
+  </p:clrMapOvr>
+</p:sld>
+</file>
+
+<file path=ppt/slides/slide24.xml><?xml version="1.0" encoding="utf-8"?>
+<p:sld xmlns:a="http://schemas.openxmlformats.org/drawingml/2006/main" xmlns:r="http://schemas.openxmlformats.org/officeDocument/2006/relationships" xmlns:p="http://schemas.openxmlformats.org/presentationml/2006/main">
+  <p:cSld>
+    <p:spTree>
+      <p:nvGrpSpPr>
+        <p:cNvPr id="1" name=""/>
+        <p:cNvGrpSpPr/>
+        <p:nvPr/>
+      </p:nvGrpSpPr>
+      <p:grpSpPr>
+        <a:xfrm>
+          <a:off x="0" y="0"/>
+          <a:ext cx="0" cy="0"/>
+          <a:chOff x="0" y="0"/>
+          <a:chExt cx="0" cy="0"/>
+        </a:xfrm>
+      </p:grpSpPr>
+      <p:sp>
+        <p:nvSpPr>
+          <p:cNvPr id="2" name="Title 1"/>
+          <p:cNvSpPr>
+            <a:spLocks noGrp="1"/>
+          </p:cNvSpPr>
+          <p:nvPr>
+            <p:ph type="title"/>
+          </p:nvPr>
+        </p:nvSpPr>
+        <p:spPr/>
+        <p:txBody>
+          <a:bodyPr/>
+          <a:lstStyle/>
+          <a:p>
+            <a:endParaRPr lang="en-SG"/>
+          </a:p>
+        </p:txBody>
+      </p:sp>
+      <p:sp>
+        <p:nvSpPr>
+          <p:cNvPr id="3" name="Content Placeholder 2"/>
+          <p:cNvSpPr>
+            <a:spLocks noGrp="1"/>
+          </p:cNvSpPr>
+          <p:nvPr>
+            <p:ph idx="1"/>
+          </p:nvPr>
+        </p:nvSpPr>
+        <p:spPr/>
+        <p:txBody>
+          <a:bodyPr/>
+          <a:lstStyle/>
+          <a:p>
+            <a:endParaRPr lang="en-SG"/>
+          </a:p>
+        </p:txBody>
+      </p:sp>
+      <p:pic>
+        <p:nvPicPr>
+          <p:cNvPr id="4" name="Picture 3" descr="Screen Shot 2015-04-08 at 1.36.31.png"/>
+          <p:cNvPicPr>
+            <a:picLocks noChangeAspect="1"/>
+          </p:cNvPicPr>
+          <p:nvPr/>
+        </p:nvPicPr>
+        <p:blipFill>
+          <a:blip r:embed="rId2" cstate="email">
+            <a:extLst>
+              <a:ext uri="{28A0092B-C50C-407E-A947-70E740481C1C}">
+                <a14:useLocalDpi xmlns:a14="http://schemas.microsoft.com/office/drawing/2010/main" xmlns="" val="0"/>
+              </a:ext>
+            </a:extLst>
+          </a:blip>
+          <a:stretch>
+            <a:fillRect/>
+          </a:stretch>
+        </p:blipFill>
+        <p:spPr>
+          <a:xfrm>
+            <a:off x="300418" y="1156655"/>
+            <a:ext cx="8712148" cy="5445093"/>
+          </a:xfrm>
+          <a:prstGeom prst="rect">
+            <a:avLst/>
+          </a:prstGeom>
+        </p:spPr>
+      </p:pic>
+    </p:spTree>
+  </p:cSld>
+  <p:clrMapOvr>
+    <a:masterClrMapping/>
+  </p:clrMapOvr>
+</p:sld>
+</file>
+
+<file path=ppt/slides/slide25.xml><?xml version="1.0" encoding="utf-8"?>
+<p:sld xmlns:a="http://schemas.openxmlformats.org/drawingml/2006/main" xmlns:r="http://schemas.openxmlformats.org/officeDocument/2006/relationships" xmlns:p="http://schemas.openxmlformats.org/presentationml/2006/main">
+  <p:cSld>
+    <p:spTree>
+      <p:nvGrpSpPr>
+        <p:cNvPr id="1" name=""/>
+        <p:cNvGrpSpPr/>
+        <p:nvPr/>
+      </p:nvGrpSpPr>
+      <p:grpSpPr>
+        <a:xfrm>
+          <a:off x="0" y="0"/>
+          <a:ext cx="0" cy="0"/>
+          <a:chOff x="0" y="0"/>
+          <a:chExt cx="0" cy="0"/>
+        </a:xfrm>
+      </p:grpSpPr>
+      <p:sp>
+        <p:nvSpPr>
+          <p:cNvPr id="2" name="Title 1"/>
+          <p:cNvSpPr>
+            <a:spLocks noGrp="1"/>
+          </p:cNvSpPr>
+          <p:nvPr>
+            <p:ph type="title"/>
+          </p:nvPr>
+        </p:nvSpPr>
+        <p:spPr/>
+        <p:txBody>
+          <a:bodyPr/>
+          <a:lstStyle/>
+          <a:p>
+            <a:endParaRPr lang="en-SG"/>
+          </a:p>
+        </p:txBody>
+      </p:sp>
+      <p:sp>
+        <p:nvSpPr>
+          <p:cNvPr id="3" name="Content Placeholder 2"/>
+          <p:cNvSpPr>
+            <a:spLocks noGrp="1"/>
+          </p:cNvSpPr>
+          <p:nvPr>
+            <p:ph idx="1"/>
+          </p:nvPr>
+        </p:nvSpPr>
+        <p:spPr/>
+        <p:txBody>
+          <a:bodyPr/>
+          <a:lstStyle/>
+          <a:p>
+            <a:endParaRPr lang="en-SG"/>
+          </a:p>
+        </p:txBody>
+      </p:sp>
+      <p:pic>
+        <p:nvPicPr>
+          <p:cNvPr id="4" name="Picture 3" descr="Screen Shot 2015-04-08 at 1.37.21.png"/>
+          <p:cNvPicPr>
+            <a:picLocks noChangeAspect="1"/>
+          </p:cNvPicPr>
+          <p:nvPr/>
+        </p:nvPicPr>
+        <p:blipFill rotWithShape="1">
+          <a:blip r:embed="rId2" cstate="email">
+            <a:extLst>
+              <a:ext uri="{28A0092B-C50C-407E-A947-70E740481C1C}">
+                <a14:useLocalDpi xmlns:a14="http://schemas.microsoft.com/office/drawing/2010/main" xmlns="" val="0"/>
+              </a:ext>
+            </a:extLst>
+          </a:blip>
+          <a:srcRect l="3850" t="1540" r="6497"/>
+          <a:stretch/>
+        </p:blipFill>
+        <p:spPr>
+          <a:xfrm>
+            <a:off x="729258" y="1258333"/>
+            <a:ext cx="7704000" cy="5287998"/>
+          </a:xfrm>
+          <a:prstGeom prst="rect">
+            <a:avLst/>
+          </a:prstGeom>
+        </p:spPr>
+      </p:pic>
+    </p:spTree>
+  </p:cSld>
+  <p:clrMapOvr>
+    <a:masterClrMapping/>
+  </p:clrMapOvr>
+</p:sld>
+</file>
+
+<file path=ppt/slides/slide26.xml><?xml version="1.0" encoding="utf-8"?>
+<p:sld xmlns:a="http://schemas.openxmlformats.org/drawingml/2006/main" xmlns:r="http://schemas.openxmlformats.org/officeDocument/2006/relationships" xmlns:p="http://schemas.openxmlformats.org/presentationml/2006/main">
+  <p:cSld>
+    <p:spTree>
+      <p:nvGrpSpPr>
+        <p:cNvPr id="1" name=""/>
+        <p:cNvGrpSpPr/>
+        <p:nvPr/>
+      </p:nvGrpSpPr>
+      <p:grpSpPr>
+        <a:xfrm>
+          <a:off x="0" y="0"/>
+          <a:ext cx="0" cy="0"/>
+          <a:chOff x="0" y="0"/>
+          <a:chExt cx="0" cy="0"/>
+        </a:xfrm>
+      </p:grpSpPr>
+      <p:sp>
+        <p:nvSpPr>
+          <p:cNvPr id="2" name="Title 1"/>
+          <p:cNvSpPr>
+            <a:spLocks noGrp="1"/>
+          </p:cNvSpPr>
+          <p:nvPr>
+            <p:ph type="title"/>
+          </p:nvPr>
+        </p:nvSpPr>
+        <p:spPr/>
+        <p:txBody>
+          <a:bodyPr/>
+          <a:lstStyle/>
+          <a:p>
+            <a:endParaRPr lang="en-SG"/>
+          </a:p>
+        </p:txBody>
+      </p:sp>
+      <p:sp>
+        <p:nvSpPr>
+          <p:cNvPr id="3" name="Content Placeholder 2"/>
+          <p:cNvSpPr>
+            <a:spLocks noGrp="1"/>
+          </p:cNvSpPr>
+          <p:nvPr>
+            <p:ph idx="1"/>
+          </p:nvPr>
+        </p:nvSpPr>
+        <p:spPr/>
+        <p:txBody>
+          <a:bodyPr/>
+          <a:lstStyle/>
+          <a:p>
+            <a:endParaRPr lang="en-SG"/>
+          </a:p>
+        </p:txBody>
+      </p:sp>
+      <p:pic>
+        <p:nvPicPr>
+          <p:cNvPr id="4" name="Picture 3" descr="Screen Shot 2015-04-08 at 1.37.51.png"/>
+          <p:cNvPicPr>
+            <a:picLocks noChangeAspect="1"/>
+          </p:cNvPicPr>
+          <p:nvPr/>
+        </p:nvPicPr>
+        <p:blipFill rotWithShape="1">
+          <a:blip r:embed="rId2" cstate="email">
+            <a:extLst>
+              <a:ext uri="{28A0092B-C50C-407E-A947-70E740481C1C}">
+                <a14:useLocalDpi xmlns:a14="http://schemas.microsoft.com/office/drawing/2010/main" xmlns="" val="0"/>
+              </a:ext>
+            </a:extLst>
+          </a:blip>
+          <a:srcRect l="2475" r="7322"/>
+          <a:stretch/>
+        </p:blipFill>
+        <p:spPr>
+          <a:xfrm>
+            <a:off x="742913" y="1230426"/>
+            <a:ext cx="7715028" cy="5345611"/>
+          </a:xfrm>
+          <a:prstGeom prst="rect">
+            <a:avLst/>
+          </a:prstGeom>
+        </p:spPr>
+      </p:pic>
+    </p:spTree>
+  </p:cSld>
+  <p:clrMapOvr>
+    <a:masterClrMapping/>
+  </p:clrMapOvr>
+</p:sld>
+</file>
+
+<file path=ppt/slides/slide27.xml><?xml version="1.0" encoding="utf-8"?>
+<p:sld xmlns:a="http://schemas.openxmlformats.org/drawingml/2006/main" xmlns:r="http://schemas.openxmlformats.org/officeDocument/2006/relationships" xmlns:p="http://schemas.openxmlformats.org/presentationml/2006/main">
+  <p:cSld>
+    <p:spTree>
+      <p:nvGrpSpPr>
+        <p:cNvPr id="1" name=""/>
+        <p:cNvGrpSpPr/>
+        <p:nvPr/>
+      </p:nvGrpSpPr>
+      <p:grpSpPr>
+        <a:xfrm>
+          <a:off x="0" y="0"/>
+          <a:ext cx="0" cy="0"/>
+          <a:chOff x="0" y="0"/>
+          <a:chExt cx="0" cy="0"/>
+        </a:xfrm>
+      </p:grpSpPr>
+      <p:sp>
+        <p:nvSpPr>
+          <p:cNvPr id="2" name="Title 1"/>
+          <p:cNvSpPr>
+            <a:spLocks noGrp="1"/>
+          </p:cNvSpPr>
+          <p:nvPr>
+            <p:ph type="title"/>
+          </p:nvPr>
+        </p:nvSpPr>
+        <p:spPr/>
+        <p:txBody>
+          <a:bodyPr/>
+          <a:lstStyle/>
+          <a:p>
+            <a:endParaRPr lang="en-SG"/>
+          </a:p>
+        </p:txBody>
+      </p:sp>
+      <p:sp>
+        <p:nvSpPr>
+          <p:cNvPr id="3" name="Content Placeholder 2"/>
+          <p:cNvSpPr>
+            <a:spLocks noGrp="1"/>
+          </p:cNvSpPr>
+          <p:nvPr>
+            <p:ph idx="1"/>
+          </p:nvPr>
+        </p:nvSpPr>
+        <p:spPr/>
+        <p:txBody>
+          <a:bodyPr/>
+          <a:lstStyle/>
+          <a:p>
+            <a:endParaRPr lang="en-SG"/>
+          </a:p>
+        </p:txBody>
+      </p:sp>
+      <p:pic>
+        <p:nvPicPr>
+          <p:cNvPr id="4" name="Picture 3" descr="Screen Shot 2015-04-08 at 1.38.28.png"/>
+          <p:cNvPicPr>
+            <a:picLocks noChangeAspect="1"/>
+          </p:cNvPicPr>
+          <p:nvPr/>
+        </p:nvPicPr>
+        <p:blipFill>
+          <a:blip r:embed="rId2" cstate="email">
+            <a:extLst>
+              <a:ext uri="{28A0092B-C50C-407E-A947-70E740481C1C}">
+                <a14:useLocalDpi xmlns:a14="http://schemas.microsoft.com/office/drawing/2010/main" xmlns="" val="0"/>
+              </a:ext>
+            </a:extLst>
+          </a:blip>
+          <a:stretch>
+            <a:fillRect/>
+          </a:stretch>
+        </p:blipFill>
+        <p:spPr>
+          <a:xfrm>
+            <a:off x="286763" y="1203115"/>
+            <a:ext cx="8496000" cy="5310000"/>
+          </a:xfrm>
+          <a:prstGeom prst="rect">
+            <a:avLst/>
+          </a:prstGeom>
+        </p:spPr>
+      </p:pic>
+    </p:spTree>
   </p:cSld>
   <p:clrMapOvr>
     <a:masterClrMapping/>
@@ -5190,7 +5903,7 @@
           <a:blip r:embed="rId3" cstate="email">
             <a:extLst>
               <a:ext uri="{28A0092B-C50C-407E-A947-70E740481C1C}">
-                <a14:useLocalDpi xmlns:a14="http://schemas.microsoft.com/office/drawing/2010/main" val="0"/>
+                <a14:useLocalDpi xmlns:a14="http://schemas.microsoft.com/office/drawing/2010/main" xmlns="" val="0"/>
               </a:ext>
             </a:extLst>
           </a:blip>
@@ -5210,7 +5923,7 @@
     </p:spTree>
     <p:extLst>
       <p:ext uri="{BB962C8B-B14F-4D97-AF65-F5344CB8AC3E}">
-        <p14:creationId xmlns:p14="http://schemas.microsoft.com/office/powerpoint/2010/main" val="3023577141"/>
+        <p14:creationId xmlns:p14="http://schemas.microsoft.com/office/powerpoint/2010/main" xmlns="" val="3023577141"/>
       </p:ext>
     </p:extLst>
   </p:cSld>
@@ -5306,7 +6019,7 @@
     </p:spTree>
     <p:extLst>
       <p:ext uri="{BB962C8B-B14F-4D97-AF65-F5344CB8AC3E}">
-        <p14:creationId xmlns:p14="http://schemas.microsoft.com/office/powerpoint/2010/main" val="4148773714"/>
+        <p14:creationId xmlns:p14="http://schemas.microsoft.com/office/powerpoint/2010/main" xmlns="" val="4148773714"/>
       </p:ext>
     </p:extLst>
   </p:cSld>
@@ -5379,11 +6092,7 @@
           <a:p>
             <a:r>
               <a:rPr lang="en-US" dirty="0" smtClean="0"/>
-              <a:t>Module </a:t>
-            </a:r>
-            <a:r>
-              <a:rPr lang="en-US" dirty="0" smtClean="0"/>
-              <a:t>button covers many elements on home screen</a:t>
+              <a:t>Module button covers many elements on home screen</a:t>
             </a:r>
           </a:p>
           <a:p>
@@ -5397,7 +6106,7 @@
     </p:spTree>
     <p:extLst>
       <p:ext uri="{BB962C8B-B14F-4D97-AF65-F5344CB8AC3E}">
-        <p14:creationId xmlns:p14="http://schemas.microsoft.com/office/powerpoint/2010/main" val="2754162101"/>
+        <p14:creationId xmlns:p14="http://schemas.microsoft.com/office/powerpoint/2010/main" xmlns="" val="2754162101"/>
       </p:ext>
     </p:extLst>
   </p:cSld>
@@ -5436,7 +6145,7 @@
           <a:blip r:embed="rId2" cstate="email">
             <a:extLst>
               <a:ext uri="{28A0092B-C50C-407E-A947-70E740481C1C}">
-                <a14:useLocalDpi xmlns:a14="http://schemas.microsoft.com/office/drawing/2010/main" val="0"/>
+                <a14:useLocalDpi xmlns:a14="http://schemas.microsoft.com/office/drawing/2010/main" xmlns="" val="0"/>
               </a:ext>
             </a:extLst>
           </a:blip>
@@ -5485,7 +6194,7 @@
     </p:spTree>
     <p:extLst>
       <p:ext uri="{BB962C8B-B14F-4D97-AF65-F5344CB8AC3E}">
-        <p14:creationId xmlns:p14="http://schemas.microsoft.com/office/powerpoint/2010/main" val="2892034444"/>
+        <p14:creationId xmlns:p14="http://schemas.microsoft.com/office/powerpoint/2010/main" xmlns="" val="2892034444"/>
       </p:ext>
     </p:extLst>
   </p:cSld>
@@ -5558,15 +6267,7 @@
           <a:p>
             <a:r>
               <a:rPr lang="en-US" dirty="0" smtClean="0"/>
-              <a:t>Cancel/Save layout consistent, </a:t>
-            </a:r>
-            <a:r>
-              <a:rPr lang="en-US" dirty="0" smtClean="0"/>
-              <a:t>minimizes </a:t>
-            </a:r>
-            <a:r>
-              <a:rPr lang="en-US" dirty="0" smtClean="0"/>
-              <a:t>user error</a:t>
+              <a:t>Cancel/Save layout consistent, minimizes user error</a:t>
             </a:r>
           </a:p>
           <a:p>
@@ -5583,7 +6284,7 @@
     </p:spTree>
     <p:extLst>
       <p:ext uri="{BB962C8B-B14F-4D97-AF65-F5344CB8AC3E}">
-        <p14:creationId xmlns:p14="http://schemas.microsoft.com/office/powerpoint/2010/main" val="83480335"/>
+        <p14:creationId xmlns:p14="http://schemas.microsoft.com/office/powerpoint/2010/main" xmlns="" val="83480335"/>
       </p:ext>
     </p:extLst>
   </p:cSld>
@@ -5658,14 +6359,13 @@
               <a:rPr lang="en-US" dirty="0" smtClean="0"/>
               <a:t>Delete unclear in edge cases (If viewing another user, and having just entered a new user without clicking search, will I delete the currently-viewed user or the new user?)</a:t>
             </a:r>
-            <a:endParaRPr lang="en-US" dirty="0" smtClean="0"/>
           </a:p>
         </p:txBody>
       </p:sp>
     </p:spTree>
     <p:extLst>
       <p:ext uri="{BB962C8B-B14F-4D97-AF65-F5344CB8AC3E}">
-        <p14:creationId xmlns:p14="http://schemas.microsoft.com/office/powerpoint/2010/main" val="335618658"/>
+        <p14:creationId xmlns:p14="http://schemas.microsoft.com/office/powerpoint/2010/main" xmlns="" val="335618658"/>
       </p:ext>
     </p:extLst>
   </p:cSld>
@@ -5704,7 +6404,7 @@
           <a:blip r:embed="rId2" cstate="email">
             <a:extLst>
               <a:ext uri="{28A0092B-C50C-407E-A947-70E740481C1C}">
-                <a14:useLocalDpi xmlns:a14="http://schemas.microsoft.com/office/drawing/2010/main" val="0"/>
+                <a14:useLocalDpi xmlns:a14="http://schemas.microsoft.com/office/drawing/2010/main" xmlns="" val="0"/>
               </a:ext>
             </a:extLst>
           </a:blip>
@@ -5752,7 +6452,7 @@
     </p:spTree>
     <p:extLst>
       <p:ext uri="{BB962C8B-B14F-4D97-AF65-F5344CB8AC3E}">
-        <p14:creationId xmlns:p14="http://schemas.microsoft.com/office/powerpoint/2010/main" val="1937616626"/>
+        <p14:creationId xmlns:p14="http://schemas.microsoft.com/office/powerpoint/2010/main" xmlns="" val="1937616626"/>
       </p:ext>
     </p:extLst>
   </p:cSld>

</xml_diff>